<commit_message>
Updated session 2/4 content
</commit_message>
<xml_diff>
--- a/presentations/Session_2_Intro_Boot.pptx
+++ b/presentations/Session_2_Intro_Boot.pptx
@@ -8,10 +8,10 @@
     <p:sldMasterId id="2147483724" r:id="rId4"/>
   </p:sldMasterIdLst>
   <p:notesMasterIdLst>
-    <p:notesMasterId r:id="rId26"/>
+    <p:notesMasterId r:id="rId27"/>
   </p:notesMasterIdLst>
   <p:handoutMasterIdLst>
-    <p:handoutMasterId r:id="rId27"/>
+    <p:handoutMasterId r:id="rId28"/>
   </p:handoutMasterIdLst>
   <p:sldIdLst>
     <p:sldId id="353" r:id="rId5"/>
@@ -35,6 +35,7 @@
     <p:sldId id="371" r:id="rId23"/>
     <p:sldId id="372" r:id="rId24"/>
     <p:sldId id="373" r:id="rId25"/>
+    <p:sldId id="376" r:id="rId26"/>
   </p:sldIdLst>
   <p:sldSz cx="9144000" cy="5143500" type="screen16x9"/>
   <p:notesSz cx="6858000" cy="9144000"/>
@@ -159,6 +160,7 @@
             <p14:sldId id="371"/>
             <p14:sldId id="372"/>
             <p14:sldId id="373"/>
+            <p14:sldId id="376"/>
           </p14:sldIdLst>
         </p14:section>
       </p14:sectionLst>
@@ -2141,6 +2143,74 @@
 </p:notes>
 </file>
 
+<file path=ppt/notesSlides/notesSlide22.xml><?xml version="1.0" encoding="utf-8"?>
+<p:notes xmlns:a="http://schemas.openxmlformats.org/drawingml/2006/main" xmlns:r="http://schemas.openxmlformats.org/officeDocument/2006/relationships" xmlns:p="http://schemas.openxmlformats.org/presentationml/2006/main">
+  <p:cSld>
+    <p:spTree>
+      <p:nvGrpSpPr>
+        <p:cNvPr id="1" name=""/>
+        <p:cNvGrpSpPr/>
+        <p:nvPr/>
+      </p:nvGrpSpPr>
+      <p:grpSpPr>
+        <a:xfrm>
+          <a:off x="0" y="0"/>
+          <a:ext cx="0" cy="0"/>
+          <a:chOff x="0" y="0"/>
+          <a:chExt cx="0" cy="0"/>
+        </a:xfrm>
+      </p:grpSpPr>
+      <p:sp>
+        <p:nvSpPr>
+          <p:cNvPr id="2" name="Slide Image Placeholder 1"/>
+          <p:cNvSpPr>
+            <a:spLocks noGrp="1" noRot="1" noChangeAspect="1"/>
+          </p:cNvSpPr>
+          <p:nvPr>
+            <p:ph type="sldImg"/>
+          </p:nvPr>
+        </p:nvSpPr>
+        <p:spPr>
+          <a:xfrm>
+            <a:off x="381000" y="685800"/>
+            <a:ext cx="6096000" cy="3429000"/>
+          </a:xfrm>
+        </p:spPr>
+      </p:sp>
+      <p:sp>
+        <p:nvSpPr>
+          <p:cNvPr id="3" name="Notes Placeholder 2"/>
+          <p:cNvSpPr>
+            <a:spLocks noGrp="1"/>
+          </p:cNvSpPr>
+          <p:nvPr>
+            <p:ph type="body" idx="1"/>
+          </p:nvPr>
+        </p:nvSpPr>
+        <p:spPr/>
+        <p:txBody>
+          <a:bodyPr lIns="90571" tIns="45286" rIns="90571" bIns="45286">
+            <a:normAutofit/>
+          </a:bodyPr>
+          <a:lstStyle/>
+          <a:p>
+            <a:endParaRPr lang="en-US" dirty="0"/>
+          </a:p>
+        </p:txBody>
+      </p:sp>
+    </p:spTree>
+    <p:extLst>
+      <p:ext uri="{BB962C8B-B14F-4D97-AF65-F5344CB8AC3E}">
+        <p14:creationId xmlns:p14="http://schemas.microsoft.com/office/powerpoint/2010/main" val="2318069329"/>
+      </p:ext>
+    </p:extLst>
+  </p:cSld>
+  <p:clrMapOvr>
+    <a:masterClrMapping/>
+  </p:clrMapOvr>
+</p:notes>
+</file>
+
 <file path=ppt/notesSlides/notesSlide3.xml><?xml version="1.0" encoding="utf-8"?>
 <p:notes xmlns:a="http://schemas.openxmlformats.org/drawingml/2006/main" xmlns:r="http://schemas.openxmlformats.org/officeDocument/2006/relationships" xmlns:p="http://schemas.openxmlformats.org/presentationml/2006/main" showMasterSp="0" showMasterPhAnim="0">
   <p:cSld>
@@ -3038,6 +3108,183 @@
 
 <file path=ppt/slideLayouts/slideLayout10.xml><?xml version="1.0" encoding="utf-8"?>
 <p:sldLayout xmlns:a="http://schemas.openxmlformats.org/drawingml/2006/main" xmlns:r="http://schemas.openxmlformats.org/officeDocument/2006/relationships" xmlns:p="http://schemas.openxmlformats.org/presentationml/2006/main" preserve="1" userDrawn="1">
+  <p:cSld name="Main Page">
+    <p:spTree>
+      <p:nvGrpSpPr>
+        <p:cNvPr id="1" name=""/>
+        <p:cNvGrpSpPr/>
+        <p:nvPr/>
+      </p:nvGrpSpPr>
+      <p:grpSpPr>
+        <a:xfrm>
+          <a:off x="0" y="0"/>
+          <a:ext cx="0" cy="0"/>
+          <a:chOff x="0" y="0"/>
+          <a:chExt cx="0" cy="0"/>
+        </a:xfrm>
+      </p:grpSpPr>
+      <p:sp>
+        <p:nvSpPr>
+          <p:cNvPr id="2" name="Title 1"/>
+          <p:cNvSpPr>
+            <a:spLocks noGrp="1"/>
+          </p:cNvSpPr>
+          <p:nvPr>
+            <p:ph type="title"/>
+          </p:nvPr>
+        </p:nvSpPr>
+        <p:spPr>
+          <a:xfrm>
+            <a:off x="113722" y="149918"/>
+            <a:ext cx="8796928" cy="474445"/>
+          </a:xfrm>
+          <a:prstGeom prst="rect">
+            <a:avLst/>
+          </a:prstGeom>
+        </p:spPr>
+        <p:txBody>
+          <a:bodyPr/>
+          <a:lstStyle>
+            <a:lvl1pPr algn="l">
+              <a:defRPr sz="2800" b="1">
+                <a:solidFill>
+                  <a:srgbClr val="008774"/>
+                </a:solidFill>
+                <a:latin typeface="Arial"/>
+                <a:cs typeface="Arial"/>
+              </a:defRPr>
+            </a:lvl1pPr>
+          </a:lstStyle>
+          <a:p>
+            <a:r>
+              <a:rPr lang="en-US" dirty="0" smtClean="0"/>
+              <a:t>Click to edit Master title style</a:t>
+            </a:r>
+            <a:endParaRPr lang="en-US" dirty="0"/>
+          </a:p>
+        </p:txBody>
+      </p:sp>
+      <p:sp>
+        <p:nvSpPr>
+          <p:cNvPr id="6" name="Slide Number Placeholder 5"/>
+          <p:cNvSpPr>
+            <a:spLocks noGrp="1"/>
+          </p:cNvSpPr>
+          <p:nvPr>
+            <p:ph type="sldNum" sz="quarter" idx="12"/>
+          </p:nvPr>
+        </p:nvSpPr>
+        <p:spPr>
+          <a:xfrm>
+            <a:off x="48247" y="4861463"/>
+            <a:ext cx="373338" cy="273844"/>
+          </a:xfrm>
+          <a:prstGeom prst="rect">
+            <a:avLst/>
+          </a:prstGeom>
+        </p:spPr>
+        <p:txBody>
+          <a:bodyPr/>
+          <a:lstStyle>
+            <a:lvl1pPr>
+              <a:defRPr sz="900">
+                <a:solidFill>
+                  <a:schemeClr val="bg1">
+                    <a:lumMod val="65000"/>
+                  </a:schemeClr>
+                </a:solidFill>
+              </a:defRPr>
+            </a:lvl1pPr>
+          </a:lstStyle>
+          <a:p>
+            <a:fld id="{ADA07C09-8A41-3B46-A636-3955072BBB4F}" type="slidenum">
+              <a:rPr lang="en-US" smtClean="0">
+                <a:solidFill>
+                  <a:srgbClr val="FFFFFF">
+                    <a:lumMod val="65000"/>
+                  </a:srgbClr>
+                </a:solidFill>
+                <a:latin typeface="Arial"/>
+              </a:rPr>
+              <a:pPr/>
+              <a:t>‹#›</a:t>
+            </a:fld>
+            <a:endParaRPr lang="en-US">
+              <a:solidFill>
+                <a:srgbClr val="FFFFFF">
+                  <a:lumMod val="65000"/>
+                </a:srgbClr>
+              </a:solidFill>
+              <a:latin typeface="Arial"/>
+            </a:endParaRPr>
+          </a:p>
+        </p:txBody>
+      </p:sp>
+      <p:sp>
+        <p:nvSpPr>
+          <p:cNvPr id="13" name="Text Placeholder 12"/>
+          <p:cNvSpPr>
+            <a:spLocks noGrp="1"/>
+          </p:cNvSpPr>
+          <p:nvPr>
+            <p:ph type="body" sz="quarter" idx="13"/>
+          </p:nvPr>
+        </p:nvSpPr>
+        <p:spPr>
+          <a:xfrm>
+            <a:off x="114300" y="624363"/>
+            <a:ext cx="8796338" cy="288565"/>
+          </a:xfrm>
+          <a:prstGeom prst="rect">
+            <a:avLst/>
+          </a:prstGeom>
+        </p:spPr>
+        <p:txBody>
+          <a:bodyPr vert="horz"/>
+          <a:lstStyle>
+            <a:lvl1pPr marL="0" indent="0">
+              <a:buNone/>
+              <a:defRPr sz="1800">
+                <a:solidFill>
+                  <a:srgbClr val="7F7F7F"/>
+                </a:solidFill>
+                <a:latin typeface="Arial"/>
+                <a:cs typeface="Arial"/>
+              </a:defRPr>
+            </a:lvl1pPr>
+          </a:lstStyle>
+          <a:p>
+            <a:pPr lvl="0"/>
+            <a:r>
+              <a:rPr lang="en-US" dirty="0" smtClean="0"/>
+              <a:t>Click to edit Master</a:t>
+            </a:r>
+            <a:endParaRPr lang="en-US" dirty="0"/>
+          </a:p>
+        </p:txBody>
+      </p:sp>
+    </p:spTree>
+    <p:extLst>
+      <p:ext uri="{BB962C8B-B14F-4D97-AF65-F5344CB8AC3E}">
+        <p14:creationId xmlns:p14="http://schemas.microsoft.com/office/powerpoint/2010/main" val="3116951951"/>
+      </p:ext>
+    </p:extLst>
+  </p:cSld>
+  <p:clrMapOvr>
+    <a:masterClrMapping/>
+  </p:clrMapOvr>
+  <p:timing>
+    <p:tnLst>
+      <p:par>
+        <p:cTn xmlns:p14="http://schemas.microsoft.com/office/powerpoint/2010/main" id="1" dur="indefinite" restart="never" nodeType="tmRoot"/>
+      </p:par>
+    </p:tnLst>
+  </p:timing>
+</p:sldLayout>
+</file>
+
+<file path=ppt/slideLayouts/slideLayout11.xml><?xml version="1.0" encoding="utf-8"?>
+<p:sldLayout xmlns:a="http://schemas.openxmlformats.org/drawingml/2006/main" xmlns:r="http://schemas.openxmlformats.org/officeDocument/2006/relationships" xmlns:p="http://schemas.openxmlformats.org/presentationml/2006/main" preserve="1" userDrawn="1">
   <p:cSld name="Split">
     <p:spTree>
       <p:nvGrpSpPr>
@@ -3214,7 +3461,7 @@
 </p:sldLayout>
 </file>
 
-<file path=ppt/slideLayouts/slideLayout11.xml><?xml version="1.0" encoding="utf-8"?>
+<file path=ppt/slideLayouts/slideLayout12.xml><?xml version="1.0" encoding="utf-8"?>
 <p:sldLayout xmlns:a="http://schemas.openxmlformats.org/drawingml/2006/main" xmlns:r="http://schemas.openxmlformats.org/officeDocument/2006/relationships" xmlns:p="http://schemas.openxmlformats.org/presentationml/2006/main" preserve="1" userDrawn="1">
   <p:cSld name=" Blank logo">
     <p:spTree>
@@ -3307,7 +3554,7 @@
 </p:sldLayout>
 </file>
 
-<file path=ppt/slideLayouts/slideLayout12.xml><?xml version="1.0" encoding="utf-8"?>
+<file path=ppt/slideLayouts/slideLayout13.xml><?xml version="1.0" encoding="utf-8"?>
 <p:sldLayout xmlns:a="http://schemas.openxmlformats.org/drawingml/2006/main" xmlns:r="http://schemas.openxmlformats.org/officeDocument/2006/relationships" xmlns:p="http://schemas.openxmlformats.org/presentationml/2006/main" userDrawn="1">
   <p:cSld name="Title Only">
     <p:spTree>
@@ -3392,7 +3639,7 @@
 </p:sldLayout>
 </file>
 
-<file path=ppt/slideLayouts/slideLayout13.xml><?xml version="1.0" encoding="utf-8"?>
+<file path=ppt/slideLayouts/slideLayout14.xml><?xml version="1.0" encoding="utf-8"?>
 <p:sldLayout xmlns:a="http://schemas.openxmlformats.org/drawingml/2006/main" xmlns:r="http://schemas.openxmlformats.org/officeDocument/2006/relationships" xmlns:p="http://schemas.openxmlformats.org/presentationml/2006/main" userDrawn="1">
   <p:cSld name="Blank">
     <p:spTree>
@@ -3478,7 +3725,7 @@
 </p:sldLayout>
 </file>
 
-<file path=ppt/slideLayouts/slideLayout14.xml><?xml version="1.0" encoding="utf-8"?>
+<file path=ppt/slideLayouts/slideLayout15.xml><?xml version="1.0" encoding="utf-8"?>
 <p:sldLayout xmlns:a="http://schemas.openxmlformats.org/drawingml/2006/main" xmlns:r="http://schemas.openxmlformats.org/officeDocument/2006/relationships" xmlns:p="http://schemas.openxmlformats.org/presentationml/2006/main" type="tx">
   <p:cSld name="Title - Top">
     <p:spTree>
@@ -3542,7 +3789,7 @@
 </p:sldLayout>
 </file>
 
-<file path=ppt/slideLayouts/slideLayout15.xml><?xml version="1.0" encoding="utf-8"?>
+<file path=ppt/slideLayouts/slideLayout16.xml><?xml version="1.0" encoding="utf-8"?>
 <p:sldLayout xmlns:a="http://schemas.openxmlformats.org/drawingml/2006/main" xmlns:r="http://schemas.openxmlformats.org/officeDocument/2006/relationships" xmlns:p="http://schemas.openxmlformats.org/presentationml/2006/main" userDrawn="1">
   <p:cSld name="12_Custom Layout">
     <p:spTree>
@@ -3707,7 +3954,7 @@
 </p:sldLayout>
 </file>
 
-<file path=ppt/slideLayouts/slideLayout16.xml><?xml version="1.0" encoding="utf-8"?>
+<file path=ppt/slideLayouts/slideLayout17.xml><?xml version="1.0" encoding="utf-8"?>
 <p:sldLayout xmlns:a="http://schemas.openxmlformats.org/drawingml/2006/main" xmlns:r="http://schemas.openxmlformats.org/officeDocument/2006/relationships" xmlns:p="http://schemas.openxmlformats.org/presentationml/2006/main" preserve="1" userDrawn="1">
   <p:cSld name="Main Page">
     <p:spTree>
@@ -3934,7 +4181,7 @@
 </p:sldLayout>
 </file>
 
-<file path=ppt/slideLayouts/slideLayout17.xml><?xml version="1.0" encoding="utf-8"?>
+<file path=ppt/slideLayouts/slideLayout18.xml><?xml version="1.0" encoding="utf-8"?>
 <p:sldLayout xmlns:a="http://schemas.openxmlformats.org/drawingml/2006/main" xmlns:r="http://schemas.openxmlformats.org/officeDocument/2006/relationships" xmlns:p="http://schemas.openxmlformats.org/presentationml/2006/main" preserve="1" userDrawn="1">
   <p:cSld name="Split">
     <p:spTree>
@@ -4112,7 +4359,7 @@
 </p:sldLayout>
 </file>
 
-<file path=ppt/slideLayouts/slideLayout18.xml><?xml version="1.0" encoding="utf-8"?>
+<file path=ppt/slideLayouts/slideLayout19.xml><?xml version="1.0" encoding="utf-8"?>
 <p:sldLayout xmlns:a="http://schemas.openxmlformats.org/drawingml/2006/main" xmlns:r="http://schemas.openxmlformats.org/officeDocument/2006/relationships" xmlns:p="http://schemas.openxmlformats.org/presentationml/2006/main" preserve="1" userDrawn="1">
   <p:cSld name=" Blank logo">
     <p:spTree>
@@ -4205,7 +4452,67 @@
 </p:sldLayout>
 </file>
 
-<file path=ppt/slideLayouts/slideLayout19.xml><?xml version="1.0" encoding="utf-8"?>
+<file path=ppt/slideLayouts/slideLayout2.xml><?xml version="1.0" encoding="utf-8"?>
+<p:sldLayout xmlns:a="http://schemas.openxmlformats.org/drawingml/2006/main" xmlns:r="http://schemas.openxmlformats.org/officeDocument/2006/relationships" xmlns:p="http://schemas.openxmlformats.org/presentationml/2006/main" preserve="1" userDrawn="1">
+  <p:cSld name="1_Title and Content">
+    <p:spTree>
+      <p:nvGrpSpPr>
+        <p:cNvPr id="1" name=""/>
+        <p:cNvGrpSpPr/>
+        <p:nvPr/>
+      </p:nvGrpSpPr>
+      <p:grpSpPr>
+        <a:xfrm>
+          <a:off x="0" y="0"/>
+          <a:ext cx="0" cy="0"/>
+          <a:chOff x="0" y="0"/>
+          <a:chExt cx="0" cy="0"/>
+        </a:xfrm>
+      </p:grpSpPr>
+      <p:sp>
+        <p:nvSpPr>
+          <p:cNvPr id="6" name="Slide Number Placeholder 5"/>
+          <p:cNvSpPr>
+            <a:spLocks noGrp="1"/>
+          </p:cNvSpPr>
+          <p:nvPr>
+            <p:ph type="sldNum" sz="quarter" idx="12"/>
+          </p:nvPr>
+        </p:nvSpPr>
+        <p:spPr/>
+        <p:txBody>
+          <a:bodyPr/>
+          <a:lstStyle/>
+          <a:p>
+            <a:fld id="{ADA07C09-8A41-3B46-A636-3955072BBB4F}" type="slidenum">
+              <a:rPr lang="en-US" smtClean="0"/>
+              <a:t>‹#›</a:t>
+            </a:fld>
+            <a:endParaRPr lang="en-US"/>
+          </a:p>
+        </p:txBody>
+      </p:sp>
+    </p:spTree>
+    <p:extLst>
+      <p:ext uri="{BB962C8B-B14F-4D97-AF65-F5344CB8AC3E}">
+        <p14:creationId xmlns:p14="http://schemas.microsoft.com/office/powerpoint/2010/main" val="3839756889"/>
+      </p:ext>
+    </p:extLst>
+  </p:cSld>
+  <p:clrMapOvr>
+    <a:masterClrMapping/>
+  </p:clrMapOvr>
+  <p:timing>
+    <p:tnLst>
+      <p:par>
+        <p:cTn xmlns:p14="http://schemas.microsoft.com/office/powerpoint/2010/main" id="1" dur="indefinite" restart="never" nodeType="tmRoot"/>
+      </p:par>
+    </p:tnLst>
+  </p:timing>
+</p:sldLayout>
+</file>
+
+<file path=ppt/slideLayouts/slideLayout20.xml><?xml version="1.0" encoding="utf-8"?>
 <p:sldLayout xmlns:a="http://schemas.openxmlformats.org/drawingml/2006/main" xmlns:r="http://schemas.openxmlformats.org/officeDocument/2006/relationships" xmlns:p="http://schemas.openxmlformats.org/presentationml/2006/main" userDrawn="1">
   <p:cSld name="Title Only">
     <p:spTree>
@@ -4290,67 +4597,7 @@
 </p:sldLayout>
 </file>
 
-<file path=ppt/slideLayouts/slideLayout2.xml><?xml version="1.0" encoding="utf-8"?>
-<p:sldLayout xmlns:a="http://schemas.openxmlformats.org/drawingml/2006/main" xmlns:r="http://schemas.openxmlformats.org/officeDocument/2006/relationships" xmlns:p="http://schemas.openxmlformats.org/presentationml/2006/main" preserve="1" userDrawn="1">
-  <p:cSld name="1_Title and Content">
-    <p:spTree>
-      <p:nvGrpSpPr>
-        <p:cNvPr id="1" name=""/>
-        <p:cNvGrpSpPr/>
-        <p:nvPr/>
-      </p:nvGrpSpPr>
-      <p:grpSpPr>
-        <a:xfrm>
-          <a:off x="0" y="0"/>
-          <a:ext cx="0" cy="0"/>
-          <a:chOff x="0" y="0"/>
-          <a:chExt cx="0" cy="0"/>
-        </a:xfrm>
-      </p:grpSpPr>
-      <p:sp>
-        <p:nvSpPr>
-          <p:cNvPr id="6" name="Slide Number Placeholder 5"/>
-          <p:cNvSpPr>
-            <a:spLocks noGrp="1"/>
-          </p:cNvSpPr>
-          <p:nvPr>
-            <p:ph type="sldNum" sz="quarter" idx="12"/>
-          </p:nvPr>
-        </p:nvSpPr>
-        <p:spPr/>
-        <p:txBody>
-          <a:bodyPr/>
-          <a:lstStyle/>
-          <a:p>
-            <a:fld id="{ADA07C09-8A41-3B46-A636-3955072BBB4F}" type="slidenum">
-              <a:rPr lang="en-US" smtClean="0"/>
-              <a:t>‹#›</a:t>
-            </a:fld>
-            <a:endParaRPr lang="en-US"/>
-          </a:p>
-        </p:txBody>
-      </p:sp>
-    </p:spTree>
-    <p:extLst>
-      <p:ext uri="{BB962C8B-B14F-4D97-AF65-F5344CB8AC3E}">
-        <p14:creationId xmlns:p14="http://schemas.microsoft.com/office/powerpoint/2010/main" val="3839756889"/>
-      </p:ext>
-    </p:extLst>
-  </p:cSld>
-  <p:clrMapOvr>
-    <a:masterClrMapping/>
-  </p:clrMapOvr>
-  <p:timing>
-    <p:tnLst>
-      <p:par>
-        <p:cTn xmlns:p14="http://schemas.microsoft.com/office/powerpoint/2010/main" id="1" dur="indefinite" restart="never" nodeType="tmRoot"/>
-      </p:par>
-    </p:tnLst>
-  </p:timing>
-</p:sldLayout>
-</file>
-
-<file path=ppt/slideLayouts/slideLayout20.xml><?xml version="1.0" encoding="utf-8"?>
+<file path=ppt/slideLayouts/slideLayout21.xml><?xml version="1.0" encoding="utf-8"?>
 <p:sldLayout xmlns:a="http://schemas.openxmlformats.org/drawingml/2006/main" xmlns:r="http://schemas.openxmlformats.org/officeDocument/2006/relationships" xmlns:p="http://schemas.openxmlformats.org/presentationml/2006/main" userDrawn="1">
   <p:cSld name="Blank">
     <p:spTree>
@@ -4436,7 +4683,7 @@
 </p:sldLayout>
 </file>
 
-<file path=ppt/slideLayouts/slideLayout21.xml><?xml version="1.0" encoding="utf-8"?>
+<file path=ppt/slideLayouts/slideLayout22.xml><?xml version="1.0" encoding="utf-8"?>
 <p:sldLayout xmlns:a="http://schemas.openxmlformats.org/drawingml/2006/main" xmlns:r="http://schemas.openxmlformats.org/officeDocument/2006/relationships" xmlns:p="http://schemas.openxmlformats.org/presentationml/2006/main" type="tx">
   <p:cSld name="Title - Top">
     <p:spTree>
@@ -4500,7 +4747,7 @@
 </p:sldLayout>
 </file>
 
-<file path=ppt/slideLayouts/slideLayout22.xml><?xml version="1.0" encoding="utf-8"?>
+<file path=ppt/slideLayouts/slideLayout23.xml><?xml version="1.0" encoding="utf-8"?>
 <p:sldLayout xmlns:a="http://schemas.openxmlformats.org/drawingml/2006/main" xmlns:r="http://schemas.openxmlformats.org/officeDocument/2006/relationships" xmlns:p="http://schemas.openxmlformats.org/presentationml/2006/main" userDrawn="1">
   <p:cSld name="12_Custom Layout">
     <p:spTree>
@@ -4768,6 +5015,307 @@
 
 <file path=ppt/slideLayouts/slideLayout4.xml><?xml version="1.0" encoding="utf-8"?>
 <p:sldLayout xmlns:a="http://schemas.openxmlformats.org/drawingml/2006/main" xmlns:r="http://schemas.openxmlformats.org/officeDocument/2006/relationships" xmlns:p="http://schemas.openxmlformats.org/presentationml/2006/main">
+  <p:cSld name="black background">
+    <p:spTree>
+      <p:nvGrpSpPr>
+        <p:cNvPr id="1" name="Shape 61"/>
+        <p:cNvGrpSpPr/>
+        <p:nvPr/>
+      </p:nvGrpSpPr>
+      <p:grpSpPr>
+        <a:xfrm>
+          <a:off x="0" y="0"/>
+          <a:ext cx="0" cy="0"/>
+          <a:chOff x="0" y="0"/>
+          <a:chExt cx="0" cy="0"/>
+        </a:xfrm>
+      </p:grpSpPr>
+      <p:sp>
+        <p:nvSpPr>
+          <p:cNvPr id="62" name="Shape 62"/>
+          <p:cNvSpPr/>
+          <p:nvPr/>
+        </p:nvSpPr>
+        <p:spPr>
+          <a:xfrm>
+            <a:off x="0" y="0"/>
+            <a:ext cx="9144000" cy="5143499"/>
+          </a:xfrm>
+          <a:prstGeom prst="rect">
+            <a:avLst/>
+          </a:prstGeom>
+          <a:solidFill>
+            <a:srgbClr val="000000"/>
+          </a:solidFill>
+          <a:ln w="12700" cap="flat">
+            <a:solidFill>
+              <a:schemeClr val="lt2"/>
+            </a:solidFill>
+            <a:prstDash val="solid"/>
+            <a:round/>
+            <a:headEnd type="none" w="med" len="med"/>
+            <a:tailEnd type="none" w="med" len="med"/>
+          </a:ln>
+        </p:spPr>
+        <p:txBody>
+          <a:bodyPr lIns="91425" tIns="45700" rIns="91425" bIns="45700" anchor="ctr" anchorCtr="0">
+            <a:noAutofit/>
+          </a:bodyPr>
+          <a:lstStyle/>
+          <a:p>
+            <a:pPr marL="0" marR="0" lvl="0" indent="0" algn="ctr" rtl="0">
+              <a:lnSpc>
+                <a:spcPct val="100000"/>
+              </a:lnSpc>
+              <a:spcBef>
+                <a:spcPts val="0"/>
+              </a:spcBef>
+              <a:spcAft>
+                <a:spcPts val="0"/>
+              </a:spcAft>
+              <a:buClr>
+                <a:schemeClr val="lt1"/>
+              </a:buClr>
+              <a:buFont typeface="Arial"/>
+              <a:buNone/>
+            </a:pPr>
+            <a:endParaRPr sz="1800" b="0" i="0" u="none" strike="noStrike" cap="none" baseline="0">
+              <a:solidFill>
+                <a:srgbClr val="FFFFFF"/>
+              </a:solidFill>
+              <a:latin typeface="Arial"/>
+              <a:ea typeface="Arial"/>
+              <a:cs typeface="Arial"/>
+              <a:sym typeface="Arial"/>
+              <a:rtl val="0"/>
+            </a:endParaRPr>
+          </a:p>
+        </p:txBody>
+      </p:sp>
+      <p:sp>
+        <p:nvSpPr>
+          <p:cNvPr id="63" name="Shape 63"/>
+          <p:cNvSpPr/>
+          <p:nvPr/>
+        </p:nvSpPr>
+        <p:spPr>
+          <a:xfrm>
+            <a:off x="0" y="4629150"/>
+            <a:ext cx="9144000" cy="385800"/>
+          </a:xfrm>
+          <a:prstGeom prst="rect">
+            <a:avLst/>
+          </a:prstGeom>
+          <a:solidFill>
+            <a:srgbClr val="00786E"/>
+          </a:solidFill>
+          <a:ln>
+            <a:noFill/>
+          </a:ln>
+        </p:spPr>
+        <p:txBody>
+          <a:bodyPr lIns="91425" tIns="45700" rIns="91425" bIns="45700" anchor="ctr" anchorCtr="0">
+            <a:noAutofit/>
+          </a:bodyPr>
+          <a:lstStyle/>
+          <a:p>
+            <a:pPr marL="0" marR="0" lvl="0" indent="0" algn="l" rtl="0">
+              <a:lnSpc>
+                <a:spcPct val="100000"/>
+              </a:lnSpc>
+              <a:spcBef>
+                <a:spcPts val="0"/>
+              </a:spcBef>
+              <a:spcAft>
+                <a:spcPts val="0"/>
+              </a:spcAft>
+              <a:buClr>
+                <a:schemeClr val="lt1"/>
+              </a:buClr>
+              <a:buFont typeface="Arial"/>
+              <a:buNone/>
+            </a:pPr>
+            <a:endParaRPr sz="1800" b="0" i="0" u="none" strike="noStrike" cap="none" baseline="0">
+              <a:solidFill>
+                <a:srgbClr val="FFFFFF"/>
+              </a:solidFill>
+              <a:latin typeface="Arial"/>
+              <a:ea typeface="Arial"/>
+              <a:cs typeface="Arial"/>
+              <a:sym typeface="Arial"/>
+              <a:rtl val="0"/>
+            </a:endParaRPr>
+          </a:p>
+        </p:txBody>
+      </p:sp>
+      <p:sp>
+        <p:nvSpPr>
+          <p:cNvPr id="64" name="Shape 64"/>
+          <p:cNvSpPr txBox="1"/>
+          <p:nvPr/>
+        </p:nvSpPr>
+        <p:spPr>
+          <a:xfrm flipH="1">
+            <a:off x="8553450" y="5021262"/>
+            <a:ext cx="533399" cy="123899"/>
+          </a:xfrm>
+          <a:prstGeom prst="rect">
+            <a:avLst/>
+          </a:prstGeom>
+          <a:noFill/>
+          <a:ln>
+            <a:noFill/>
+          </a:ln>
+        </p:spPr>
+        <p:txBody>
+          <a:bodyPr lIns="0" tIns="0" rIns="0" bIns="0" anchor="t" anchorCtr="0">
+            <a:noAutofit/>
+          </a:bodyPr>
+          <a:lstStyle/>
+          <a:p>
+            <a:pPr marL="0" marR="0" lvl="0" indent="0" algn="r" rtl="0">
+              <a:lnSpc>
+                <a:spcPct val="100000"/>
+              </a:lnSpc>
+              <a:spcBef>
+                <a:spcPts val="0"/>
+              </a:spcBef>
+              <a:spcAft>
+                <a:spcPts val="0"/>
+              </a:spcAft>
+              <a:buClr>
+                <a:srgbClr val="7F7F7F"/>
+              </a:buClr>
+              <a:buSzPct val="25000"/>
+              <a:buFont typeface="Arial"/>
+              <a:buNone/>
+            </a:pPr>
+            <a:fld id="{00000000-1234-1234-1234-123412341234}" type="slidenum">
+              <a:rPr lang="en" sz="800" b="0" i="0" u="none" strike="noStrike" cap="none" baseline="0">
+                <a:solidFill>
+                  <a:srgbClr val="7F7F7F"/>
+                </a:solidFill>
+                <a:latin typeface="Arial"/>
+                <a:ea typeface="Arial"/>
+                <a:cs typeface="Arial"/>
+                <a:sym typeface="Arial"/>
+                <a:rtl val="0"/>
+              </a:rPr>
+              <a:t>‹#›</a:t>
+            </a:fld>
+            <a:endParaRPr lang="en" sz="800" b="0" i="0" u="none" strike="noStrike" cap="none" baseline="0">
+              <a:solidFill>
+                <a:srgbClr val="7F7F7F"/>
+              </a:solidFill>
+              <a:latin typeface="Arial"/>
+              <a:ea typeface="Arial"/>
+              <a:cs typeface="Arial"/>
+              <a:sym typeface="Arial"/>
+              <a:rtl val="0"/>
+            </a:endParaRPr>
+          </a:p>
+        </p:txBody>
+      </p:sp>
+      <p:sp>
+        <p:nvSpPr>
+          <p:cNvPr id="65" name="Shape 65"/>
+          <p:cNvSpPr txBox="1"/>
+          <p:nvPr/>
+        </p:nvSpPr>
+        <p:spPr>
+          <a:xfrm>
+            <a:off x="366712" y="5018087"/>
+            <a:ext cx="2274900" cy="99900"/>
+          </a:xfrm>
+          <a:prstGeom prst="rect">
+            <a:avLst/>
+          </a:prstGeom>
+          <a:noFill/>
+          <a:ln>
+            <a:noFill/>
+          </a:ln>
+        </p:spPr>
+        <p:txBody>
+          <a:bodyPr lIns="0" tIns="0" rIns="0" bIns="0" anchor="t" anchorCtr="0">
+            <a:noAutofit/>
+          </a:bodyPr>
+          <a:lstStyle/>
+          <a:p>
+            <a:pPr marL="0" marR="0" lvl="0" indent="0" algn="l" rtl="0">
+              <a:lnSpc>
+                <a:spcPct val="100000"/>
+              </a:lnSpc>
+              <a:spcBef>
+                <a:spcPts val="0"/>
+              </a:spcBef>
+              <a:spcAft>
+                <a:spcPts val="0"/>
+              </a:spcAft>
+              <a:buClr>
+                <a:srgbClr val="7F7F7F"/>
+              </a:buClr>
+              <a:buSzPct val="25000"/>
+              <a:buFont typeface="Arial"/>
+              <a:buNone/>
+            </a:pPr>
+            <a:r>
+              <a:rPr lang="en" sz="600" b="0" i="0" u="none" strike="noStrike" cap="none" baseline="0">
+                <a:solidFill>
+                  <a:srgbClr val="7F7F7F"/>
+                </a:solidFill>
+                <a:latin typeface="Arial"/>
+                <a:ea typeface="Arial"/>
+                <a:cs typeface="Arial"/>
+                <a:sym typeface="Arial"/>
+                <a:rtl val="0"/>
+              </a:rPr>
+              <a:t>© Copyright 2013 Pivotal. All rights reserved.</a:t>
+            </a:r>
+          </a:p>
+        </p:txBody>
+      </p:sp>
+      <p:pic>
+        <p:nvPicPr>
+          <p:cNvPr id="66" name="Shape 66"/>
+          <p:cNvPicPr preferRelativeResize="0"/>
+          <p:nvPr/>
+        </p:nvPicPr>
+        <p:blipFill rotWithShape="1">
+          <a:blip r:embed="rId2">
+            <a:alphaModFix/>
+          </a:blip>
+          <a:srcRect/>
+          <a:stretch/>
+        </p:blipFill>
+        <p:spPr>
+          <a:xfrm>
+            <a:off x="7942263" y="4713287"/>
+            <a:ext cx="957299" cy="220800"/>
+          </a:xfrm>
+          <a:prstGeom prst="rect">
+            <a:avLst/>
+          </a:prstGeom>
+          <a:noFill/>
+          <a:ln>
+            <a:noFill/>
+          </a:ln>
+        </p:spPr>
+      </p:pic>
+    </p:spTree>
+    <p:extLst>
+      <p:ext uri="{BB962C8B-B14F-4D97-AF65-F5344CB8AC3E}">
+        <p14:creationId xmlns:p14="http://schemas.microsoft.com/office/powerpoint/2010/main" val="347398857"/>
+      </p:ext>
+    </p:extLst>
+  </p:cSld>
+  <p:clrMapOvr>
+    <a:masterClrMapping/>
+  </p:clrMapOvr>
+</p:sldLayout>
+</file>
+
+<file path=ppt/slideLayouts/slideLayout5.xml><?xml version="1.0" encoding="utf-8"?>
+<p:sldLayout xmlns:a="http://schemas.openxmlformats.org/drawingml/2006/main" xmlns:r="http://schemas.openxmlformats.org/officeDocument/2006/relationships" xmlns:p="http://schemas.openxmlformats.org/presentationml/2006/main">
   <p:cSld name="Divider 1">
     <p:spTree>
       <p:nvGrpSpPr>
@@ -5253,7 +5801,7 @@
 </p:sldLayout>
 </file>
 
-<file path=ppt/slideLayouts/slideLayout5.xml><?xml version="1.0" encoding="utf-8"?>
+<file path=ppt/slideLayouts/slideLayout6.xml><?xml version="1.0" encoding="utf-8"?>
 <p:sldLayout xmlns:a="http://schemas.openxmlformats.org/drawingml/2006/main" xmlns:r="http://schemas.openxmlformats.org/officeDocument/2006/relationships" xmlns:p="http://schemas.openxmlformats.org/presentationml/2006/main">
   <p:cSld name="1_Title and Content">
     <p:spTree>
@@ -5563,7 +6111,7 @@
 </p:sldLayout>
 </file>
 
-<file path=ppt/slideLayouts/slideLayout6.xml><?xml version="1.0" encoding="utf-8"?>
+<file path=ppt/slideLayouts/slideLayout7.xml><?xml version="1.0" encoding="utf-8"?>
 <p:sldLayout xmlns:a="http://schemas.openxmlformats.org/drawingml/2006/main" xmlns:r="http://schemas.openxmlformats.org/officeDocument/2006/relationships" xmlns:p="http://schemas.openxmlformats.org/presentationml/2006/main">
   <p:cSld name="Title Only">
     <p:spTree>
@@ -5682,7 +6230,7 @@
 </p:sldLayout>
 </file>
 
-<file path=ppt/slideLayouts/slideLayout7.xml><?xml version="1.0" encoding="utf-8"?>
+<file path=ppt/slideLayouts/slideLayout8.xml><?xml version="1.0" encoding="utf-8"?>
 <p:sldLayout xmlns:a="http://schemas.openxmlformats.org/drawingml/2006/main" xmlns:r="http://schemas.openxmlformats.org/officeDocument/2006/relationships" xmlns:p="http://schemas.openxmlformats.org/presentationml/2006/main" type="tx">
   <p:cSld name="Title - Top">
     <p:spTree>
@@ -5903,7 +6451,7 @@
 </p:sldLayout>
 </file>
 
-<file path=ppt/slideLayouts/slideLayout8.xml><?xml version="1.0" encoding="utf-8"?>
+<file path=ppt/slideLayouts/slideLayout9.xml><?xml version="1.0" encoding="utf-8"?>
 <p:sldLayout xmlns:a="http://schemas.openxmlformats.org/drawingml/2006/main" xmlns:r="http://schemas.openxmlformats.org/officeDocument/2006/relationships" xmlns:p="http://schemas.openxmlformats.org/presentationml/2006/main" type="tx">
   <p:cSld name="Title and Content">
     <p:spTree>
@@ -6267,183 +6815,6 @@
   <p:clrMapOvr>
     <a:masterClrMapping/>
   </p:clrMapOvr>
-</p:sldLayout>
-</file>
-
-<file path=ppt/slideLayouts/slideLayout9.xml><?xml version="1.0" encoding="utf-8"?>
-<p:sldLayout xmlns:a="http://schemas.openxmlformats.org/drawingml/2006/main" xmlns:r="http://schemas.openxmlformats.org/officeDocument/2006/relationships" xmlns:p="http://schemas.openxmlformats.org/presentationml/2006/main" preserve="1" userDrawn="1">
-  <p:cSld name="Main Page">
-    <p:spTree>
-      <p:nvGrpSpPr>
-        <p:cNvPr id="1" name=""/>
-        <p:cNvGrpSpPr/>
-        <p:nvPr/>
-      </p:nvGrpSpPr>
-      <p:grpSpPr>
-        <a:xfrm>
-          <a:off x="0" y="0"/>
-          <a:ext cx="0" cy="0"/>
-          <a:chOff x="0" y="0"/>
-          <a:chExt cx="0" cy="0"/>
-        </a:xfrm>
-      </p:grpSpPr>
-      <p:sp>
-        <p:nvSpPr>
-          <p:cNvPr id="2" name="Title 1"/>
-          <p:cNvSpPr>
-            <a:spLocks noGrp="1"/>
-          </p:cNvSpPr>
-          <p:nvPr>
-            <p:ph type="title"/>
-          </p:nvPr>
-        </p:nvSpPr>
-        <p:spPr>
-          <a:xfrm>
-            <a:off x="113722" y="149918"/>
-            <a:ext cx="8796928" cy="474445"/>
-          </a:xfrm>
-          <a:prstGeom prst="rect">
-            <a:avLst/>
-          </a:prstGeom>
-        </p:spPr>
-        <p:txBody>
-          <a:bodyPr/>
-          <a:lstStyle>
-            <a:lvl1pPr algn="l">
-              <a:defRPr sz="2800" b="1">
-                <a:solidFill>
-                  <a:srgbClr val="008774"/>
-                </a:solidFill>
-                <a:latin typeface="Arial"/>
-                <a:cs typeface="Arial"/>
-              </a:defRPr>
-            </a:lvl1pPr>
-          </a:lstStyle>
-          <a:p>
-            <a:r>
-              <a:rPr lang="en-US" dirty="0" smtClean="0"/>
-              <a:t>Click to edit Master title style</a:t>
-            </a:r>
-            <a:endParaRPr lang="en-US" dirty="0"/>
-          </a:p>
-        </p:txBody>
-      </p:sp>
-      <p:sp>
-        <p:nvSpPr>
-          <p:cNvPr id="6" name="Slide Number Placeholder 5"/>
-          <p:cNvSpPr>
-            <a:spLocks noGrp="1"/>
-          </p:cNvSpPr>
-          <p:nvPr>
-            <p:ph type="sldNum" sz="quarter" idx="12"/>
-          </p:nvPr>
-        </p:nvSpPr>
-        <p:spPr>
-          <a:xfrm>
-            <a:off x="48247" y="4861463"/>
-            <a:ext cx="373338" cy="273844"/>
-          </a:xfrm>
-          <a:prstGeom prst="rect">
-            <a:avLst/>
-          </a:prstGeom>
-        </p:spPr>
-        <p:txBody>
-          <a:bodyPr/>
-          <a:lstStyle>
-            <a:lvl1pPr>
-              <a:defRPr sz="900">
-                <a:solidFill>
-                  <a:schemeClr val="bg1">
-                    <a:lumMod val="65000"/>
-                  </a:schemeClr>
-                </a:solidFill>
-              </a:defRPr>
-            </a:lvl1pPr>
-          </a:lstStyle>
-          <a:p>
-            <a:fld id="{ADA07C09-8A41-3B46-A636-3955072BBB4F}" type="slidenum">
-              <a:rPr lang="en-US" smtClean="0">
-                <a:solidFill>
-                  <a:srgbClr val="FFFFFF">
-                    <a:lumMod val="65000"/>
-                  </a:srgbClr>
-                </a:solidFill>
-                <a:latin typeface="Arial"/>
-              </a:rPr>
-              <a:pPr/>
-              <a:t>‹#›</a:t>
-            </a:fld>
-            <a:endParaRPr lang="en-US">
-              <a:solidFill>
-                <a:srgbClr val="FFFFFF">
-                  <a:lumMod val="65000"/>
-                </a:srgbClr>
-              </a:solidFill>
-              <a:latin typeface="Arial"/>
-            </a:endParaRPr>
-          </a:p>
-        </p:txBody>
-      </p:sp>
-      <p:sp>
-        <p:nvSpPr>
-          <p:cNvPr id="13" name="Text Placeholder 12"/>
-          <p:cNvSpPr>
-            <a:spLocks noGrp="1"/>
-          </p:cNvSpPr>
-          <p:nvPr>
-            <p:ph type="body" sz="quarter" idx="13"/>
-          </p:nvPr>
-        </p:nvSpPr>
-        <p:spPr>
-          <a:xfrm>
-            <a:off x="114300" y="624363"/>
-            <a:ext cx="8796338" cy="288565"/>
-          </a:xfrm>
-          <a:prstGeom prst="rect">
-            <a:avLst/>
-          </a:prstGeom>
-        </p:spPr>
-        <p:txBody>
-          <a:bodyPr vert="horz"/>
-          <a:lstStyle>
-            <a:lvl1pPr marL="0" indent="0">
-              <a:buNone/>
-              <a:defRPr sz="1800">
-                <a:solidFill>
-                  <a:srgbClr val="7F7F7F"/>
-                </a:solidFill>
-                <a:latin typeface="Arial"/>
-                <a:cs typeface="Arial"/>
-              </a:defRPr>
-            </a:lvl1pPr>
-          </a:lstStyle>
-          <a:p>
-            <a:pPr lvl="0"/>
-            <a:r>
-              <a:rPr lang="en-US" dirty="0" smtClean="0"/>
-              <a:t>Click to edit Master</a:t>
-            </a:r>
-            <a:endParaRPr lang="en-US" dirty="0"/>
-          </a:p>
-        </p:txBody>
-      </p:sp>
-    </p:spTree>
-    <p:extLst>
-      <p:ext uri="{BB962C8B-B14F-4D97-AF65-F5344CB8AC3E}">
-        <p14:creationId xmlns:p14="http://schemas.microsoft.com/office/powerpoint/2010/main" val="3116951951"/>
-      </p:ext>
-    </p:extLst>
-  </p:cSld>
-  <p:clrMapOvr>
-    <a:masterClrMapping/>
-  </p:clrMapOvr>
-  <p:timing>
-    <p:tnLst>
-      <p:par>
-        <p:cTn xmlns:p14="http://schemas.microsoft.com/office/powerpoint/2010/main" id="1" dur="indefinite" restart="never" nodeType="tmRoot"/>
-      </p:par>
-    </p:tnLst>
-  </p:timing>
 </p:sldLayout>
 </file>
 
@@ -6525,7 +6896,7 @@
           <p:nvPr userDrawn="1"/>
         </p:nvPicPr>
         <p:blipFill>
-          <a:blip r:embed="rId5">
+          <a:blip r:embed="rId6">
             <a:extLst>
               <a:ext uri="{28A0092B-C50C-407E-A947-70E740481C1C}">
                 <a14:useLocalDpi xmlns:a14="http://schemas.microsoft.com/office/drawing/2010/main" val="0"/>
@@ -6558,6 +6929,7 @@
     <p:sldLayoutId id="2147483650" r:id="rId1"/>
     <p:sldLayoutId id="2147483732" r:id="rId2"/>
     <p:sldLayoutId id="2147483733" r:id="rId3"/>
+    <p:sldLayoutId id="2147483734" r:id="rId4"/>
   </p:sldLayoutIdLst>
   <p:timing>
     <p:tnLst>
@@ -14119,6 +14491,418 @@
     <p:extLst>
       <p:ext uri="{BB962C8B-B14F-4D97-AF65-F5344CB8AC3E}">
         <p14:creationId xmlns:p14="http://schemas.microsoft.com/office/powerpoint/2010/main" val="501115713"/>
+      </p:ext>
+    </p:extLst>
+  </p:cSld>
+  <p:clrMapOvr>
+    <a:masterClrMapping/>
+  </p:clrMapOvr>
+  <mc:AlternateContent xmlns:mc="http://schemas.openxmlformats.org/markup-compatibility/2006" xmlns:p14="http://schemas.microsoft.com/office/powerpoint/2010/main">
+    <mc:Choice Requires="p14">
+      <p:transition p14:dur="0"/>
+    </mc:Choice>
+    <mc:Fallback xmlns="">
+      <p:transition xmlns:p14="http://schemas.microsoft.com/office/powerpoint/2010/main"/>
+    </mc:Fallback>
+  </mc:AlternateContent>
+  <p:timing>
+    <p:tnLst>
+      <p:par>
+        <p:cTn xmlns:p14="http://schemas.microsoft.com/office/powerpoint/2010/main" id="1" dur="indefinite" restart="never" nodeType="tmRoot"/>
+      </p:par>
+    </p:tnLst>
+  </p:timing>
+</p:sld>
+</file>
+
+<file path=ppt/slides/slide22.xml><?xml version="1.0" encoding="utf-8"?>
+<p:sld xmlns:a="http://schemas.openxmlformats.org/drawingml/2006/main" xmlns:r="http://schemas.openxmlformats.org/officeDocument/2006/relationships" xmlns:p="http://schemas.openxmlformats.org/presentationml/2006/main">
+  <p:cSld>
+    <p:spTree>
+      <p:nvGrpSpPr>
+        <p:cNvPr id="1" name=""/>
+        <p:cNvGrpSpPr/>
+        <p:nvPr/>
+      </p:nvGrpSpPr>
+      <p:grpSpPr>
+        <a:xfrm>
+          <a:off x="0" y="0"/>
+          <a:ext cx="0" cy="0"/>
+          <a:chOff x="0" y="0"/>
+          <a:chExt cx="0" cy="0"/>
+        </a:xfrm>
+      </p:grpSpPr>
+      <p:pic>
+        <p:nvPicPr>
+          <p:cNvPr id="19" name="Picture 18" descr="Stocksy_txp157cab05rEJ000_Medium_423382.jpg"/>
+          <p:cNvPicPr>
+            <a:picLocks noChangeAspect="1"/>
+          </p:cNvPicPr>
+          <p:nvPr/>
+        </p:nvPicPr>
+        <p:blipFill>
+          <a:blip r:embed="rId3"/>
+          <a:srcRect t="15584"/>
+          <a:stretch>
+            <a:fillRect/>
+          </a:stretch>
+        </p:blipFill>
+        <p:spPr>
+          <a:xfrm>
+            <a:off x="0" y="0"/>
+            <a:ext cx="9144000" cy="5143500"/>
+          </a:xfrm>
+          <a:prstGeom prst="rect">
+            <a:avLst/>
+          </a:prstGeom>
+        </p:spPr>
+      </p:pic>
+      <p:sp>
+        <p:nvSpPr>
+          <p:cNvPr id="20" name="Rectangle 19"/>
+          <p:cNvSpPr/>
+          <p:nvPr/>
+        </p:nvSpPr>
+        <p:spPr>
+          <a:xfrm>
+            <a:off x="0" y="0"/>
+            <a:ext cx="9144000" cy="5143500"/>
+          </a:xfrm>
+          <a:prstGeom prst="rect">
+            <a:avLst/>
+          </a:prstGeom>
+          <a:gradFill flip="none" rotWithShape="1">
+            <a:gsLst>
+              <a:gs pos="8000">
+                <a:srgbClr val="000000">
+                  <a:alpha val="0"/>
+                </a:srgbClr>
+              </a:gs>
+              <a:gs pos="54000">
+                <a:srgbClr val="000000">
+                  <a:alpha val="86000"/>
+                </a:srgbClr>
+              </a:gs>
+              <a:gs pos="83000">
+                <a:srgbClr val="000000">
+                  <a:alpha val="89000"/>
+                </a:srgbClr>
+              </a:gs>
+            </a:gsLst>
+            <a:lin ang="16500000" scaled="0"/>
+            <a:tileRect/>
+          </a:gradFill>
+          <a:ln w="44450" cap="flat" cmpd="sng" algn="ctr">
+            <a:noFill/>
+            <a:prstDash val="solid"/>
+            <a:round/>
+            <a:headEnd type="none" w="med" len="med"/>
+            <a:tailEnd type="none" w="med" len="med"/>
+          </a:ln>
+          <a:effectLst/>
+        </p:spPr>
+        <p:txBody>
+          <a:bodyPr lIns="68579" tIns="34289" rIns="68579" bIns="34289" rtlCol="0" anchor="ctr"/>
+          <a:lstStyle/>
+          <a:p>
+            <a:pPr algn="ctr">
+              <a:defRPr/>
+            </a:pPr>
+            <a:endParaRPr lang="en-US" kern="0">
+              <a:solidFill>
+                <a:srgbClr val="FFFFFF"/>
+              </a:solidFill>
+            </a:endParaRPr>
+          </a:p>
+        </p:txBody>
+      </p:sp>
+      <p:cxnSp>
+        <p:nvCxnSpPr>
+          <p:cNvPr id="40" name="Straight Connector 39"/>
+          <p:cNvCxnSpPr/>
+          <p:nvPr/>
+        </p:nvCxnSpPr>
+        <p:spPr>
+          <a:xfrm>
+            <a:off x="596900" y="2111130"/>
+            <a:ext cx="7848600" cy="1588"/>
+          </a:xfrm>
+          <a:prstGeom prst="line">
+            <a:avLst/>
+          </a:prstGeom>
+          <a:ln w="22225" cap="flat" cmpd="sng" algn="ctr">
+            <a:gradFill flip="none" rotWithShape="1">
+              <a:gsLst>
+                <a:gs pos="0">
+                  <a:schemeClr val="accent1">
+                    <a:alpha val="0"/>
+                  </a:schemeClr>
+                </a:gs>
+                <a:gs pos="100000">
+                  <a:schemeClr val="bg2">
+                    <a:alpha val="0"/>
+                  </a:schemeClr>
+                </a:gs>
+                <a:gs pos="49000">
+                  <a:schemeClr val="accent1"/>
+                </a:gs>
+              </a:gsLst>
+              <a:path path="circle">
+                <a:fillToRect l="100000" t="100000"/>
+              </a:path>
+              <a:tileRect r="-100000" b="-100000"/>
+            </a:gradFill>
+            <a:prstDash val="solid"/>
+            <a:round/>
+            <a:headEnd type="none" w="med" len="med"/>
+            <a:tailEnd type="none" w="med" len="med"/>
+          </a:ln>
+        </p:spPr>
+        <p:style>
+          <a:lnRef idx="2">
+            <a:schemeClr val="accent1"/>
+          </a:lnRef>
+          <a:fillRef idx="0">
+            <a:schemeClr val="accent1"/>
+          </a:fillRef>
+          <a:effectRef idx="1">
+            <a:schemeClr val="accent1"/>
+          </a:effectRef>
+          <a:fontRef idx="minor">
+            <a:schemeClr val="tx1"/>
+          </a:fontRef>
+        </p:style>
+      </p:cxnSp>
+      <p:cxnSp>
+        <p:nvCxnSpPr>
+          <p:cNvPr id="41" name="Straight Connector 40"/>
+          <p:cNvCxnSpPr/>
+          <p:nvPr/>
+        </p:nvCxnSpPr>
+        <p:spPr>
+          <a:xfrm>
+            <a:off x="596900" y="3428754"/>
+            <a:ext cx="7848600" cy="1588"/>
+          </a:xfrm>
+          <a:prstGeom prst="line">
+            <a:avLst/>
+          </a:prstGeom>
+          <a:ln w="22225" cap="flat" cmpd="sng" algn="ctr">
+            <a:gradFill flip="none" rotWithShape="1">
+              <a:gsLst>
+                <a:gs pos="0">
+                  <a:schemeClr val="accent1">
+                    <a:alpha val="0"/>
+                  </a:schemeClr>
+                </a:gs>
+                <a:gs pos="100000">
+                  <a:schemeClr val="bg2">
+                    <a:alpha val="0"/>
+                  </a:schemeClr>
+                </a:gs>
+                <a:gs pos="49000">
+                  <a:schemeClr val="accent1"/>
+                </a:gs>
+              </a:gsLst>
+              <a:path path="circle">
+                <a:fillToRect l="100000" t="100000"/>
+              </a:path>
+              <a:tileRect r="-100000" b="-100000"/>
+            </a:gradFill>
+            <a:prstDash val="solid"/>
+            <a:round/>
+            <a:headEnd type="none" w="med" len="med"/>
+            <a:tailEnd type="none" w="med" len="med"/>
+          </a:ln>
+        </p:spPr>
+        <p:style>
+          <a:lnRef idx="2">
+            <a:schemeClr val="accent1"/>
+          </a:lnRef>
+          <a:fillRef idx="0">
+            <a:schemeClr val="accent1"/>
+          </a:fillRef>
+          <a:effectRef idx="1">
+            <a:schemeClr val="accent1"/>
+          </a:effectRef>
+          <a:fontRef idx="minor">
+            <a:schemeClr val="tx1"/>
+          </a:fontRef>
+        </p:style>
+      </p:cxnSp>
+      <p:sp>
+        <p:nvSpPr>
+          <p:cNvPr id="18" name="Shape 1014"/>
+          <p:cNvSpPr txBox="1">
+            <a:spLocks/>
+          </p:cNvSpPr>
+          <p:nvPr/>
+        </p:nvSpPr>
+        <p:spPr>
+          <a:xfrm>
+            <a:off x="1820794" y="1336859"/>
+            <a:ext cx="5209487" cy="460500"/>
+          </a:xfrm>
+          <a:prstGeom prst="rect">
+            <a:avLst/>
+          </a:prstGeom>
+          <a:noFill/>
+          <a:ln>
+            <a:noFill/>
+          </a:ln>
+        </p:spPr>
+        <p:txBody>
+          <a:bodyPr lIns="0" tIns="0" rIns="0" bIns="0" anchor="t" anchorCtr="0">
+            <a:noAutofit/>
+          </a:bodyPr>
+          <a:lstStyle/>
+          <a:p>
+            <a:pPr algn="dist">
+              <a:lnSpc>
+                <a:spcPct val="90000"/>
+              </a:lnSpc>
+              <a:buSzPct val="25000"/>
+              <a:defRPr/>
+            </a:pPr>
+            <a:endParaRPr lang="en" sz="4500" b="1" kern="0" cap="all" dirty="0">
+              <a:solidFill>
+                <a:srgbClr val="008881"/>
+              </a:solidFill>
+              <a:ea typeface="Arial"/>
+              <a:cs typeface="Arial"/>
+              <a:sym typeface="Arial"/>
+            </a:endParaRPr>
+          </a:p>
+        </p:txBody>
+      </p:sp>
+      <p:sp>
+        <p:nvSpPr>
+          <p:cNvPr id="10" name="Shape 1163"/>
+          <p:cNvSpPr txBox="1">
+            <a:spLocks/>
+          </p:cNvSpPr>
+          <p:nvPr/>
+        </p:nvSpPr>
+        <p:spPr bwMode="gray">
+          <a:xfrm>
+            <a:off x="205956" y="1396070"/>
+            <a:ext cx="8410499" cy="460500"/>
+          </a:xfrm>
+          <a:prstGeom prst="rect">
+            <a:avLst/>
+          </a:prstGeom>
+          <a:noFill/>
+          <a:ln>
+            <a:noFill/>
+          </a:ln>
+        </p:spPr>
+        <p:txBody>
+          <a:bodyPr lIns="0" tIns="0" rIns="0" bIns="0" anchor="t" anchorCtr="0">
+            <a:noAutofit/>
+          </a:bodyPr>
+          <a:lstStyle>
+            <a:defPPr marR="0" algn="l" rtl="0">
+              <a:lnSpc>
+                <a:spcPct val="100000"/>
+              </a:lnSpc>
+              <a:spcBef>
+                <a:spcPts val="0"/>
+              </a:spcBef>
+              <a:spcAft>
+                <a:spcPts val="0"/>
+              </a:spcAft>
+            </a:defPPr>
+            <a:lvl1pPr marR="0" algn="l" rtl="0">
+              <a:lnSpc>
+                <a:spcPct val="90000"/>
+              </a:lnSpc>
+              <a:spcBef>
+                <a:spcPts val="0"/>
+              </a:spcBef>
+              <a:spcAft>
+                <a:spcPts val="0"/>
+              </a:spcAft>
+              <a:buNone/>
+              <a:defRPr sz="3200" b="0" i="0" u="none" strike="noStrike" cap="none" baseline="0">
+                <a:solidFill>
+                  <a:schemeClr val="tx2"/>
+                </a:solidFill>
+                <a:latin typeface="Arial"/>
+                <a:ea typeface="Arial"/>
+                <a:cs typeface="Arial"/>
+                <a:sym typeface="Arial"/>
+              </a:defRPr>
+            </a:lvl1pPr>
+            <a:lvl2pPr marR="0" algn="l" rtl="0">
+              <a:lnSpc>
+                <a:spcPct val="100000"/>
+              </a:lnSpc>
+              <a:spcBef>
+                <a:spcPts val="0"/>
+              </a:spcBef>
+              <a:spcAft>
+                <a:spcPts val="0"/>
+              </a:spcAft>
+              <a:buNone/>
+              <a:defRPr sz="1400" b="0" i="0" u="none" strike="noStrike" cap="none" baseline="0">
+                <a:solidFill>
+                  <a:srgbClr val="000000"/>
+                </a:solidFill>
+                <a:latin typeface="Arial"/>
+                <a:ea typeface="Arial"/>
+                <a:cs typeface="Arial"/>
+                <a:sym typeface="Arial"/>
+              </a:defRPr>
+            </a:lvl2pPr>
+          </a:lstStyle>
+          <a:p>
+            <a:pPr algn="ctr">
+              <a:buSzPct val="25000"/>
+            </a:pPr>
+            <a:r>
+              <a:rPr lang="en-US" cap="all" dirty="0" smtClean="0">
+                <a:solidFill>
+                  <a:srgbClr val="74CEC7"/>
+                </a:solidFill>
+              </a:rPr>
+              <a:t>Lab</a:t>
+            </a:r>
+            <a:endParaRPr lang="en" sz="2100" cap="all" dirty="0">
+              <a:solidFill>
+                <a:srgbClr val="74CEC7"/>
+              </a:solidFill>
+            </a:endParaRPr>
+          </a:p>
+        </p:txBody>
+      </p:sp>
+      <p:pic>
+        <p:nvPicPr>
+          <p:cNvPr id="8" name="Picture 7"/>
+          <p:cNvPicPr>
+            <a:picLocks noChangeAspect="1"/>
+          </p:cNvPicPr>
+          <p:nvPr/>
+        </p:nvPicPr>
+        <p:blipFill>
+          <a:blip r:embed="rId4"/>
+          <a:stretch>
+            <a:fillRect/>
+          </a:stretch>
+        </p:blipFill>
+        <p:spPr>
+          <a:xfrm>
+            <a:off x="3939164" y="2307878"/>
+            <a:ext cx="947796" cy="947796"/>
+          </a:xfrm>
+          <a:prstGeom prst="rect">
+            <a:avLst/>
+          </a:prstGeom>
+        </p:spPr>
+      </p:pic>
+    </p:spTree>
+    <p:extLst>
+      <p:ext uri="{BB962C8B-B14F-4D97-AF65-F5344CB8AC3E}">
+        <p14:creationId xmlns:p14="http://schemas.microsoft.com/office/powerpoint/2010/main" val="169419451"/>
       </p:ext>
     </p:extLst>
   </p:cSld>

</xml_diff>

<commit_message>
Fixed issues reported by the team on Boeing graphic and link to labs.
</commit_message>
<xml_diff>
--- a/presentations/Session_2_Intro_Boot.pptx
+++ b/presentations/Session_2_Intro_Boot.pptx
@@ -251,7 +251,7 @@
           <a:p>
             <a:fld id="{372E5B6B-8713-8747-AE5B-F1241B2BF5F0}" type="datetimeFigureOut">
               <a:rPr lang="en-US" smtClean="0"/>
-              <a:t>3/3/16</a:t>
+              <a:t>4/14/16</a:t>
             </a:fld>
             <a:endParaRPr lang="en-US"/>
           </a:p>
@@ -417,7 +417,7 @@
           <a:p>
             <a:fld id="{7E7B7340-DDD5-1B49-81AA-25BC4050C073}" type="datetimeFigureOut">
               <a:rPr lang="en-US" smtClean="0"/>
-              <a:t>3/3/16</a:t>
+              <a:t>4/14/16</a:t>
             </a:fld>
             <a:endParaRPr lang="en-US"/>
           </a:p>
@@ -9401,26 +9401,35 @@
       </p:sp>
       <p:pic>
         <p:nvPicPr>
-          <p:cNvPr id="7" name="Picture 6"/>
+          <p:cNvPr id="9" name="Picture 8" descr="1280px-Boeing-Logo.svg.png"/>
           <p:cNvPicPr>
             <a:picLocks noChangeAspect="1"/>
           </p:cNvPicPr>
           <p:nvPr/>
         </p:nvPicPr>
         <p:blipFill>
-          <a:blip r:embed="rId5"/>
+          <a:blip r:embed="rId5">
+            <a:extLst>
+              <a:ext uri="{28A0092B-C50C-407E-A947-70E740481C1C}">
+                <a14:useLocalDpi xmlns:a14="http://schemas.microsoft.com/office/drawing/2010/main" val="0"/>
+              </a:ext>
+            </a:extLst>
+          </a:blip>
           <a:stretch>
             <a:fillRect/>
           </a:stretch>
         </p:blipFill>
         <p:spPr>
           <a:xfrm>
-            <a:off x="8196204" y="1558"/>
-            <a:ext cx="947796" cy="947796"/>
+            <a:off x="7698364" y="162560"/>
+            <a:ext cx="1053018" cy="660400"/>
           </a:xfrm>
           <a:prstGeom prst="rect">
             <a:avLst/>
           </a:prstGeom>
+          <a:solidFill>
+            <a:schemeClr val="bg1"/>
+          </a:solidFill>
         </p:spPr>
       </p:pic>
     </p:spTree>
@@ -10488,12 +10497,6 @@
               </a:rPr>
               <a:t> Example</a:t>
             </a:r>
-            <a:endParaRPr lang="en-US" sz="2400" dirty="0" smtClean="0">
-              <a:solidFill>
-                <a:srgbClr val="EEECE1"/>
-              </a:solidFill>
-              <a:sym typeface="Arial"/>
-            </a:endParaRPr>
           </a:p>
           <a:p>
             <a:pPr marL="514350" lvl="0" indent="-514350">
@@ -10512,12 +10515,6 @@
               </a:rPr>
               <a:t>Dependency Management</a:t>
             </a:r>
-            <a:endParaRPr lang="en-US" sz="2800" dirty="0" smtClean="0">
-              <a:solidFill>
-                <a:schemeClr val="accent6"/>
-              </a:solidFill>
-              <a:sym typeface="Arial"/>
-            </a:endParaRPr>
           </a:p>
           <a:p>
             <a:pPr marL="514350" lvl="0" indent="-514350">
@@ -12092,12 +12089,6 @@
               </a:rPr>
               <a:t> Example</a:t>
             </a:r>
-            <a:endParaRPr lang="en-US" sz="2400" dirty="0" smtClean="0">
-              <a:solidFill>
-                <a:srgbClr val="EEECE1"/>
-              </a:solidFill>
-              <a:sym typeface="Arial"/>
-            </a:endParaRPr>
           </a:p>
           <a:p>
             <a:pPr marL="514350" lvl="0" indent="-514350">
@@ -12116,12 +12107,6 @@
               </a:rPr>
               <a:t>Dependency Management</a:t>
             </a:r>
-            <a:endParaRPr lang="en-US" sz="2800" dirty="0" smtClean="0">
-              <a:solidFill>
-                <a:srgbClr val="EEECE1"/>
-              </a:solidFill>
-              <a:sym typeface="Arial"/>
-            </a:endParaRPr>
           </a:p>
           <a:p>
             <a:pPr marL="514350" lvl="0" indent="-514350">
@@ -13132,7 +13117,16 @@
                 </a:solidFill>
                 <a:sym typeface="Arial"/>
               </a:rPr>
-              <a:t>spring</a:t>
+              <a:t>spring-boot-starter-</a:t>
+            </a:r>
+            <a:r>
+              <a:rPr lang="en-US" sz="2400" i="1" dirty="0" err="1" smtClean="0">
+                <a:solidFill>
+                  <a:schemeClr val="accent6"/>
+                </a:solidFill>
+                <a:sym typeface="Arial"/>
+              </a:rPr>
+              <a:t>jdbc</a:t>
             </a:r>
             <a:r>
               <a:rPr lang="en-US" sz="2400" i="1" dirty="0" smtClean="0">
@@ -13141,68 +13135,44 @@
                 </a:solidFill>
                 <a:sym typeface="Arial"/>
               </a:rPr>
-              <a:t>-boot-starter-</a:t>
+              <a:t> </a:t>
+            </a:r>
+            <a:r>
+              <a:rPr lang="en-US" sz="2400" dirty="0" smtClean="0">
+                <a:solidFill>
+                  <a:srgbClr val="EEECE1"/>
+                </a:solidFill>
+                <a:sym typeface="Arial"/>
+              </a:rPr>
+              <a:t>or </a:t>
+            </a:r>
+            <a:r>
+              <a:rPr lang="en-US" sz="2400" i="1" dirty="0" smtClean="0">
+                <a:solidFill>
+                  <a:srgbClr val="F79646"/>
+                </a:solidFill>
+                <a:sym typeface="Arial"/>
+              </a:rPr>
+              <a:t>spring-boot-starter-data-</a:t>
             </a:r>
             <a:r>
               <a:rPr lang="en-US" sz="2400" i="1" dirty="0" err="1" smtClean="0">
                 <a:solidFill>
-                  <a:schemeClr val="accent6"/>
-                </a:solidFill>
-                <a:sym typeface="Arial"/>
-              </a:rPr>
-              <a:t>jdbc</a:t>
-            </a:r>
-            <a:r>
-              <a:rPr lang="en-US" sz="2400" i="1" dirty="0" smtClean="0">
-                <a:solidFill>
-                  <a:schemeClr val="accent6"/>
+                  <a:srgbClr val="F79646"/>
+                </a:solidFill>
+                <a:sym typeface="Arial"/>
+              </a:rPr>
+              <a:t>jpa</a:t>
+            </a:r>
+            <a:r>
+              <a:rPr lang="en-US" sz="2400" dirty="0" smtClean="0">
+                <a:solidFill>
+                  <a:srgbClr val="EEECE1"/>
                 </a:solidFill>
                 <a:sym typeface="Arial"/>
               </a:rPr>
               <a:t> </a:t>
             </a:r>
-            <a:r>
-              <a:rPr lang="en-US" sz="2400" dirty="0" smtClean="0">
-                <a:solidFill>
-                  <a:srgbClr val="EEECE1"/>
-                </a:solidFill>
-                <a:sym typeface="Arial"/>
-              </a:rPr>
-              <a:t>or </a:t>
-            </a:r>
-            <a:r>
-              <a:rPr lang="en-US" sz="2400" i="1" dirty="0" smtClean="0">
-                <a:solidFill>
-                  <a:srgbClr val="F79646"/>
-                </a:solidFill>
-                <a:sym typeface="Arial"/>
-              </a:rPr>
-              <a:t>spring-boot-starter-data-</a:t>
-            </a:r>
-            <a:r>
-              <a:rPr lang="en-US" sz="2400" i="1" dirty="0" err="1" smtClean="0">
-                <a:solidFill>
-                  <a:srgbClr val="F79646"/>
-                </a:solidFill>
-                <a:sym typeface="Arial"/>
-              </a:rPr>
-              <a:t>jpa</a:t>
-            </a:r>
-            <a:r>
-              <a:rPr lang="en-US" sz="2400" dirty="0" smtClean="0">
-                <a:solidFill>
-                  <a:srgbClr val="EEECE1"/>
-                </a:solidFill>
-                <a:sym typeface="Arial"/>
-              </a:rPr>
-              <a:t> </a:t>
-            </a:r>
-            <a:endParaRPr lang="en-US" sz="2400" dirty="0" smtClean="0">
-              <a:solidFill>
-                <a:srgbClr val="EEECE1"/>
-              </a:solidFill>
-              <a:sym typeface="Arial"/>
-            </a:endParaRPr>
           </a:p>
           <a:p>
             <a:pPr marL="0" indent="0">
@@ -13227,16 +13197,7 @@
                 </a:solidFill>
                 <a:sym typeface="Arial"/>
               </a:rPr>
-              <a:t>and </a:t>
-            </a:r>
-            <a:r>
-              <a:rPr lang="en-US" sz="2400" dirty="0" smtClean="0">
-                <a:solidFill>
-                  <a:srgbClr val="EEECE1"/>
-                </a:solidFill>
-                <a:sym typeface="Arial"/>
-              </a:rPr>
-              <a:t>include a JDBC driver on classpath</a:t>
+              <a:t>and include a JDBC driver on classpath</a:t>
             </a:r>
             <a:endParaRPr lang="en-US" sz="2000" dirty="0" smtClean="0">
               <a:solidFill>
@@ -13801,12 +13762,6 @@
               </a:rPr>
               <a:t> Example</a:t>
             </a:r>
-            <a:endParaRPr lang="en-US" sz="2400" dirty="0" smtClean="0">
-              <a:solidFill>
-                <a:srgbClr val="EEECE1"/>
-              </a:solidFill>
-              <a:sym typeface="Arial"/>
-            </a:endParaRPr>
           </a:p>
           <a:p>
             <a:pPr marL="514350" lvl="0" indent="-514350">
@@ -13825,12 +13780,6 @@
               </a:rPr>
               <a:t>Dependency Management</a:t>
             </a:r>
-            <a:endParaRPr lang="en-US" sz="2800" dirty="0" smtClean="0">
-              <a:solidFill>
-                <a:srgbClr val="EEECE1"/>
-              </a:solidFill>
-              <a:sym typeface="Arial"/>
-            </a:endParaRPr>
           </a:p>
           <a:p>
             <a:pPr marL="514350" lvl="0" indent="-514350">

</xml_diff>